<commit_message>
full picture for the entire solition added
</commit_message>
<xml_diff>
--- a/100DaysOfCodeAndUmbracoV9.pptx
+++ b/100DaysOfCodeAndUmbracoV9.pptx
@@ -5,10 +5,10 @@
     <p:sldMasterId id="2147483660" r:id="rId4"/>
   </p:sldMasterIdLst>
   <p:notesMasterIdLst>
-    <p:notesMasterId r:id="rId15"/>
+    <p:notesMasterId r:id="rId16"/>
   </p:notesMasterIdLst>
   <p:handoutMasterIdLst>
-    <p:handoutMasterId r:id="rId16"/>
+    <p:handoutMasterId r:id="rId17"/>
   </p:handoutMasterIdLst>
   <p:sldIdLst>
     <p:sldId id="256" r:id="rId5"/>
@@ -20,7 +20,8 @@
     <p:sldId id="287" r:id="rId11"/>
     <p:sldId id="288" r:id="rId12"/>
     <p:sldId id="289" r:id="rId13"/>
-    <p:sldId id="290" r:id="rId14"/>
+    <p:sldId id="291" r:id="rId14"/>
+    <p:sldId id="290" r:id="rId15"/>
   </p:sldIdLst>
   <p:sldSz cx="12192000" cy="6858000"/>
   <p:notesSz cx="6858000" cy="9144000"/>
@@ -137,6 +138,7 @@
             <p14:sldId id="287"/>
             <p14:sldId id="288"/>
             <p14:sldId id="289"/>
+            <p14:sldId id="291"/>
             <p14:sldId id="290"/>
           </p14:sldIdLst>
         </p14:section>
@@ -2414,6 +2416,361 @@
 </file>
 
 <file path=ppt/slides/slide10.xml><?xml version="1.0" encoding="utf-8"?>
+<p:sld xmlns:a="http://schemas.openxmlformats.org/drawingml/2006/main" xmlns:r="http://schemas.openxmlformats.org/officeDocument/2006/relationships" xmlns:p="http://schemas.openxmlformats.org/presentationml/2006/main">
+  <p:cSld>
+    <p:spTree>
+      <p:nvGrpSpPr>
+        <p:cNvPr id="1" name=""/>
+        <p:cNvGrpSpPr/>
+        <p:nvPr/>
+      </p:nvGrpSpPr>
+      <p:grpSpPr>
+        <a:xfrm>
+          <a:off x="0" y="0"/>
+          <a:ext cx="0" cy="0"/>
+          <a:chOff x="0" y="0"/>
+          <a:chExt cx="0" cy="0"/>
+        </a:xfrm>
+      </p:grpSpPr>
+      <p:sp>
+        <p:nvSpPr>
+          <p:cNvPr id="8" name="Title 7"/>
+          <p:cNvSpPr>
+            <a:spLocks noGrp="1"/>
+          </p:cNvSpPr>
+          <p:nvPr>
+            <p:ph type="title"/>
+          </p:nvPr>
+        </p:nvSpPr>
+        <p:spPr>
+          <a:xfrm>
+            <a:off x="521207" y="448056"/>
+            <a:ext cx="8276804" cy="640080"/>
+          </a:xfrm>
+        </p:spPr>
+        <p:txBody>
+          <a:bodyPr>
+            <a:noAutofit/>
+          </a:bodyPr>
+          <a:lstStyle/>
+          <a:p>
+            <a:r>
+              <a:rPr lang="tr-TR" dirty="0">
+                <a:latin typeface="Segoe UI Light" panose="020B0502040204020203" pitchFamily="34" charset="0"/>
+                <a:cs typeface="Segoe UI Light" panose="020B0502040204020203" pitchFamily="34" charset="0"/>
+              </a:rPr>
+              <a:t>Architecting a new Umbraco v9 solution</a:t>
+            </a:r>
+            <a:endParaRPr lang="en-US" dirty="0">
+              <a:latin typeface="Segoe UI Light" panose="020B0502040204020203" pitchFamily="34" charset="0"/>
+              <a:cs typeface="Segoe UI Light" panose="020B0502040204020203" pitchFamily="34" charset="0"/>
+            </a:endParaRPr>
+          </a:p>
+        </p:txBody>
+      </p:sp>
+      <p:sp>
+        <p:nvSpPr>
+          <p:cNvPr id="38" name="Content Placeholder 17"/>
+          <p:cNvSpPr txBox="1">
+            <a:spLocks/>
+          </p:cNvSpPr>
+          <p:nvPr/>
+        </p:nvSpPr>
+        <p:spPr>
+          <a:xfrm>
+            <a:off x="541610" y="1524708"/>
+            <a:ext cx="4321704" cy="3871518"/>
+          </a:xfrm>
+          <a:prstGeom prst="rect">
+            <a:avLst/>
+          </a:prstGeom>
+        </p:spPr>
+        <p:txBody>
+          <a:bodyPr vert="horz" lIns="91440" tIns="45720" rIns="91440" bIns="45720" rtlCol="0">
+            <a:normAutofit/>
+          </a:bodyPr>
+          <a:lstStyle>
+            <a:lvl1pPr marL="228600" indent="-228600" algn="l" defTabSz="914400" rtl="0" eaLnBrk="1" latinLnBrk="0" hangingPunct="1">
+              <a:lnSpc>
+                <a:spcPts val="1800"/>
+              </a:lnSpc>
+              <a:spcBef>
+                <a:spcPts val="1000"/>
+              </a:spcBef>
+              <a:spcAft>
+                <a:spcPts val="1000"/>
+              </a:spcAft>
+              <a:buFont typeface="Arial" panose="020B0604020202020204" pitchFamily="34" charset="0"/>
+              <a:buChar char="•"/>
+              <a:defRPr lang="en-US" sz="1200" kern="1200" smtClean="0">
+                <a:solidFill>
+                  <a:schemeClr val="tx1">
+                    <a:lumMod val="75000"/>
+                    <a:lumOff val="25000"/>
+                  </a:schemeClr>
+                </a:solidFill>
+                <a:latin typeface="+mn-lt"/>
+                <a:ea typeface="+mn-ea"/>
+                <a:cs typeface="+mn-cs"/>
+              </a:defRPr>
+            </a:lvl1pPr>
+            <a:lvl2pPr marL="685800" indent="-228600" algn="l" defTabSz="914400" rtl="0" eaLnBrk="1" latinLnBrk="0" hangingPunct="1">
+              <a:lnSpc>
+                <a:spcPts val="1800"/>
+              </a:lnSpc>
+              <a:spcBef>
+                <a:spcPts val="1000"/>
+              </a:spcBef>
+              <a:spcAft>
+                <a:spcPts val="1000"/>
+              </a:spcAft>
+              <a:buFont typeface="Arial" panose="020B0604020202020204" pitchFamily="34" charset="0"/>
+              <a:buChar char="•"/>
+              <a:defRPr lang="en-US" sz="1200" kern="1200" smtClean="0">
+                <a:solidFill>
+                  <a:schemeClr val="tx1">
+                    <a:lumMod val="75000"/>
+                    <a:lumOff val="25000"/>
+                  </a:schemeClr>
+                </a:solidFill>
+                <a:latin typeface="+mn-lt"/>
+                <a:ea typeface="+mn-ea"/>
+                <a:cs typeface="+mn-cs"/>
+              </a:defRPr>
+            </a:lvl2pPr>
+            <a:lvl3pPr marL="1143000" indent="-228600" algn="l" defTabSz="914400" rtl="0" eaLnBrk="1" latinLnBrk="0" hangingPunct="1">
+              <a:lnSpc>
+                <a:spcPts val="1800"/>
+              </a:lnSpc>
+              <a:spcBef>
+                <a:spcPts val="1000"/>
+              </a:spcBef>
+              <a:spcAft>
+                <a:spcPts val="1000"/>
+              </a:spcAft>
+              <a:buFont typeface="Arial" panose="020B0604020202020204" pitchFamily="34" charset="0"/>
+              <a:buChar char="•"/>
+              <a:defRPr lang="en-US" sz="1200" kern="1200" smtClean="0">
+                <a:solidFill>
+                  <a:schemeClr val="tx1">
+                    <a:lumMod val="75000"/>
+                    <a:lumOff val="25000"/>
+                  </a:schemeClr>
+                </a:solidFill>
+                <a:latin typeface="+mn-lt"/>
+                <a:ea typeface="+mn-ea"/>
+                <a:cs typeface="+mn-cs"/>
+              </a:defRPr>
+            </a:lvl3pPr>
+            <a:lvl4pPr marL="1600200" indent="-228600" algn="l" defTabSz="914400" rtl="0" eaLnBrk="1" latinLnBrk="0" hangingPunct="1">
+              <a:lnSpc>
+                <a:spcPts val="1800"/>
+              </a:lnSpc>
+              <a:spcBef>
+                <a:spcPts val="1000"/>
+              </a:spcBef>
+              <a:spcAft>
+                <a:spcPts val="1000"/>
+              </a:spcAft>
+              <a:buFont typeface="Arial" panose="020B0604020202020204" pitchFamily="34" charset="0"/>
+              <a:buChar char="•"/>
+              <a:defRPr lang="en-US" sz="1200" kern="1200" smtClean="0">
+                <a:solidFill>
+                  <a:schemeClr val="tx1">
+                    <a:lumMod val="75000"/>
+                    <a:lumOff val="25000"/>
+                  </a:schemeClr>
+                </a:solidFill>
+                <a:latin typeface="+mn-lt"/>
+                <a:ea typeface="+mn-ea"/>
+                <a:cs typeface="+mn-cs"/>
+              </a:defRPr>
+            </a:lvl4pPr>
+            <a:lvl5pPr marL="2057400" indent="-228600" algn="l" defTabSz="914400" rtl="0" eaLnBrk="1" latinLnBrk="0" hangingPunct="1">
+              <a:lnSpc>
+                <a:spcPts val="1800"/>
+              </a:lnSpc>
+              <a:spcBef>
+                <a:spcPts val="1000"/>
+              </a:spcBef>
+              <a:spcAft>
+                <a:spcPts val="1000"/>
+              </a:spcAft>
+              <a:buFont typeface="Arial" panose="020B0604020202020204" pitchFamily="34" charset="0"/>
+              <a:buChar char="•"/>
+              <a:defRPr lang="en-US" sz="1200" kern="1200">
+                <a:solidFill>
+                  <a:schemeClr val="tx1">
+                    <a:lumMod val="75000"/>
+                    <a:lumOff val="25000"/>
+                  </a:schemeClr>
+                </a:solidFill>
+                <a:latin typeface="+mn-lt"/>
+                <a:ea typeface="+mn-ea"/>
+                <a:cs typeface="+mn-cs"/>
+              </a:defRPr>
+            </a:lvl5pPr>
+            <a:lvl6pPr marL="2514600" indent="-228600" algn="l" defTabSz="914400" rtl="0" eaLnBrk="1" latinLnBrk="0" hangingPunct="1">
+              <a:lnSpc>
+                <a:spcPct val="90000"/>
+              </a:lnSpc>
+              <a:spcBef>
+                <a:spcPct val="30000"/>
+              </a:spcBef>
+              <a:buFont typeface="Arial" panose="020B0604020202020204" pitchFamily="34" charset="0"/>
+              <a:buChar char="•"/>
+              <a:defRPr sz="1800" kern="1200">
+                <a:solidFill>
+                  <a:schemeClr val="tx1"/>
+                </a:solidFill>
+                <a:latin typeface="+mn-lt"/>
+                <a:ea typeface="+mn-ea"/>
+                <a:cs typeface="+mn-cs"/>
+              </a:defRPr>
+            </a:lvl6pPr>
+            <a:lvl7pPr marL="2971800" indent="-228600" algn="l" defTabSz="914400" rtl="0" eaLnBrk="1" latinLnBrk="0" hangingPunct="1">
+              <a:lnSpc>
+                <a:spcPct val="90000"/>
+              </a:lnSpc>
+              <a:spcBef>
+                <a:spcPct val="30000"/>
+              </a:spcBef>
+              <a:buFont typeface="Arial" panose="020B0604020202020204" pitchFamily="34" charset="0"/>
+              <a:buChar char="•"/>
+              <a:defRPr sz="1800" kern="1200">
+                <a:solidFill>
+                  <a:schemeClr val="tx1"/>
+                </a:solidFill>
+                <a:latin typeface="+mn-lt"/>
+                <a:ea typeface="+mn-ea"/>
+                <a:cs typeface="+mn-cs"/>
+              </a:defRPr>
+            </a:lvl7pPr>
+            <a:lvl8pPr marL="3429000" indent="-228600" algn="l" defTabSz="914400" rtl="0" eaLnBrk="1" latinLnBrk="0" hangingPunct="1">
+              <a:lnSpc>
+                <a:spcPct val="90000"/>
+              </a:lnSpc>
+              <a:spcBef>
+                <a:spcPct val="30000"/>
+              </a:spcBef>
+              <a:buFont typeface="Arial" panose="020B0604020202020204" pitchFamily="34" charset="0"/>
+              <a:buChar char="•"/>
+              <a:defRPr sz="1800" kern="1200">
+                <a:solidFill>
+                  <a:schemeClr val="tx1"/>
+                </a:solidFill>
+                <a:latin typeface="+mn-lt"/>
+                <a:ea typeface="+mn-ea"/>
+                <a:cs typeface="+mn-cs"/>
+              </a:defRPr>
+            </a:lvl8pPr>
+            <a:lvl9pPr marL="3886200" indent="-228600" algn="l" defTabSz="914400" rtl="0" eaLnBrk="1" latinLnBrk="0" hangingPunct="1">
+              <a:lnSpc>
+                <a:spcPct val="90000"/>
+              </a:lnSpc>
+              <a:spcBef>
+                <a:spcPct val="30000"/>
+              </a:spcBef>
+              <a:buFont typeface="Arial" panose="020B0604020202020204" pitchFamily="34" charset="0"/>
+              <a:buChar char="•"/>
+              <a:defRPr sz="1800" kern="1200">
+                <a:solidFill>
+                  <a:schemeClr val="tx1"/>
+                </a:solidFill>
+                <a:latin typeface="+mn-lt"/>
+                <a:ea typeface="+mn-ea"/>
+                <a:cs typeface="+mn-cs"/>
+              </a:defRPr>
+            </a:lvl9pPr>
+          </a:lstStyle>
+          <a:p>
+            <a:pPr lvl="0">
+              <a:spcAft>
+                <a:spcPts val="600"/>
+              </a:spcAft>
+              <a:buFont typeface="Wingdings" panose="05000000000000000000" pitchFamily="2" charset="2"/>
+              <a:buChar char="§"/>
+              <a:defRPr/>
+            </a:pPr>
+            <a:r>
+              <a:rPr lang="tr-TR" dirty="0">
+                <a:latin typeface="Segoe UI" panose="020B0502040204020203" pitchFamily="34" charset="0"/>
+                <a:cs typeface="Segoe UI" panose="020B0502040204020203" pitchFamily="34" charset="0"/>
+              </a:rPr>
+              <a:t>Full picture for the Umbraco v9 solution with initial setup done.</a:t>
+            </a:r>
+          </a:p>
+          <a:p>
+            <a:pPr lvl="0">
+              <a:spcAft>
+                <a:spcPts val="600"/>
+              </a:spcAft>
+              <a:buFont typeface="Wingdings" panose="05000000000000000000" pitchFamily="2" charset="2"/>
+              <a:buChar char="§"/>
+              <a:defRPr/>
+            </a:pPr>
+            <a:r>
+              <a:rPr lang="tr-TR" dirty="0">
+                <a:latin typeface="Segoe UI" panose="020B0502040204020203" pitchFamily="34" charset="0"/>
+                <a:cs typeface="Segoe UI" panose="020B0502040204020203" pitchFamily="34" charset="0"/>
+              </a:rPr>
+              <a:t>More class libraries could be added to the solution as required. </a:t>
+            </a:r>
+          </a:p>
+        </p:txBody>
+      </p:sp>
+      <p:pic>
+        <p:nvPicPr>
+          <p:cNvPr id="3" name="Picture 2">
+            <a:extLst>
+              <a:ext uri="{FF2B5EF4-FFF2-40B4-BE49-F238E27FC236}">
+                <a16:creationId xmlns:a16="http://schemas.microsoft.com/office/drawing/2014/main" id="{A7435AF1-B199-436E-898D-DE3D01569D0F}"/>
+              </a:ext>
+            </a:extLst>
+          </p:cNvPr>
+          <p:cNvPicPr>
+            <a:picLocks noChangeAspect="1"/>
+          </p:cNvPicPr>
+          <p:nvPr/>
+        </p:nvPicPr>
+        <p:blipFill>
+          <a:blip r:embed="rId2"/>
+          <a:stretch>
+            <a:fillRect/>
+          </a:stretch>
+        </p:blipFill>
+        <p:spPr>
+          <a:xfrm>
+            <a:off x="7236426" y="448056"/>
+            <a:ext cx="3538666" cy="6185700"/>
+          </a:xfrm>
+          <a:prstGeom prst="rect">
+            <a:avLst/>
+          </a:prstGeom>
+        </p:spPr>
+      </p:pic>
+    </p:spTree>
+    <p:extLst>
+      <p:ext uri="{BB962C8B-B14F-4D97-AF65-F5344CB8AC3E}">
+        <p14:creationId xmlns:p14="http://schemas.microsoft.com/office/powerpoint/2010/main" val="1414052369"/>
+      </p:ext>
+    </p:extLst>
+  </p:cSld>
+  <p:clrMapOvr>
+    <a:masterClrMapping/>
+  </p:clrMapOvr>
+  <mc:AlternateContent xmlns:mc="http://schemas.openxmlformats.org/markup-compatibility/2006" xmlns:p14="http://schemas.microsoft.com/office/powerpoint/2010/main">
+    <mc:Choice Requires="p14">
+      <p:transition p14:dur="10"/>
+    </mc:Choice>
+    <mc:Fallback xmlns="">
+      <p:transition/>
+    </mc:Fallback>
+  </mc:AlternateContent>
+</p:sld>
+</file>
+
+<file path=ppt/slides/slide11.xml><?xml version="1.0" encoding="utf-8"?>
 <p:sld xmlns:a="http://schemas.openxmlformats.org/drawingml/2006/main" xmlns:r="http://schemas.openxmlformats.org/officeDocument/2006/relationships" xmlns:p="http://schemas.openxmlformats.org/presentationml/2006/main">
   <p:cSld>
     <p:spTree>
@@ -6804,12 +7161,22 @@
 </file>
 
 <file path=customXml/item1.xml><?xml version="1.0" encoding="utf-8"?>
-<?mso-contentType ?>
-<FormTemplates xmlns="http://schemas.microsoft.com/sharepoint/v3/contenttype/forms">
-  <Display>DocumentLibraryForm</Display>
-  <Edit>DocumentLibraryForm</Edit>
-  <New>DocumentLibraryForm</New>
-</FormTemplates>
+<p:properties xmlns:p="http://schemas.microsoft.com/office/2006/metadata/properties" xmlns:xsi="http://www.w3.org/2001/XMLSchema-instance" xmlns:pc="http://schemas.microsoft.com/office/infopath/2007/PartnerControls">
+  <documentManagement>
+    <_ip_UnifiedCompliancePolicyUIAction xmlns="http://schemas.microsoft.com/sharepoint/v3" xsi:nil="true"/>
+    <Image xmlns="71af3243-3dd4-4a8d-8c0d-dd76da1f02a5">
+      <Url xsi:nil="true"/>
+      <Description xsi:nil="true"/>
+    </Image>
+    <Status xmlns="71af3243-3dd4-4a8d-8c0d-dd76da1f02a5">Not started</Status>
+    <_ip_UnifiedCompliancePolicyProperties xmlns="http://schemas.microsoft.com/sharepoint/v3" xsi:nil="true"/>
+    <ImageTagsTaxHTField xmlns="71af3243-3dd4-4a8d-8c0d-dd76da1f02a5">
+      <Terms xmlns="http://schemas.microsoft.com/office/infopath/2007/PartnerControls"/>
+    </ImageTagsTaxHTField>
+    <TaxCatchAll xmlns="230e9df3-be65-4c73-a93b-d1236ebd677e"/>
+    <MediaServiceKeyPoints xmlns="71af3243-3dd4-4a8d-8c0d-dd76da1f02a5" xsi:nil="true"/>
+  </documentManagement>
+</p:properties>
 </file>
 
 <file path=customXml/item2.xml><?xml version="1.0" encoding="utf-8"?>
@@ -7089,28 +7456,22 @@
 </file>
 
 <file path=customXml/item3.xml><?xml version="1.0" encoding="utf-8"?>
-<p:properties xmlns:p="http://schemas.microsoft.com/office/2006/metadata/properties" xmlns:xsi="http://www.w3.org/2001/XMLSchema-instance" xmlns:pc="http://schemas.microsoft.com/office/infopath/2007/PartnerControls">
-  <documentManagement>
-    <_ip_UnifiedCompliancePolicyUIAction xmlns="http://schemas.microsoft.com/sharepoint/v3" xsi:nil="true"/>
-    <Image xmlns="71af3243-3dd4-4a8d-8c0d-dd76da1f02a5">
-      <Url xsi:nil="true"/>
-      <Description xsi:nil="true"/>
-    </Image>
-    <Status xmlns="71af3243-3dd4-4a8d-8c0d-dd76da1f02a5">Not started</Status>
-    <_ip_UnifiedCompliancePolicyProperties xmlns="http://schemas.microsoft.com/sharepoint/v3" xsi:nil="true"/>
-    <ImageTagsTaxHTField xmlns="71af3243-3dd4-4a8d-8c0d-dd76da1f02a5">
-      <Terms xmlns="http://schemas.microsoft.com/office/infopath/2007/PartnerControls"/>
-    </ImageTagsTaxHTField>
-    <TaxCatchAll xmlns="230e9df3-be65-4c73-a93b-d1236ebd677e"/>
-    <MediaServiceKeyPoints xmlns="71af3243-3dd4-4a8d-8c0d-dd76da1f02a5" xsi:nil="true"/>
-  </documentManagement>
-</p:properties>
+<?mso-contentType ?>
+<FormTemplates xmlns="http://schemas.microsoft.com/sharepoint/v3/contenttype/forms">
+  <Display>DocumentLibraryForm</Display>
+  <Edit>DocumentLibraryForm</Edit>
+  <New>DocumentLibraryForm</New>
+</FormTemplates>
 </file>
 
 <file path=customXml/itemProps1.xml><?xml version="1.0" encoding="utf-8"?>
-<ds:datastoreItem xmlns:ds="http://schemas.openxmlformats.org/officeDocument/2006/customXml" ds:itemID="{AB64C1E2-42EA-4660-BCB7-94E6DA7562F1}">
+<ds:datastoreItem xmlns:ds="http://schemas.openxmlformats.org/officeDocument/2006/customXml" ds:itemID="{2045902D-8BCA-4596-9829-0D7D1289C020}">
   <ds:schemaRefs>
-    <ds:schemaRef ds:uri="http://schemas.microsoft.com/sharepoint/v3/contenttype/forms"/>
+    <ds:schemaRef ds:uri="http://schemas.microsoft.com/office/2006/metadata/properties"/>
+    <ds:schemaRef ds:uri="http://schemas.microsoft.com/office/infopath/2007/PartnerControls"/>
+    <ds:schemaRef ds:uri="http://schemas.microsoft.com/sharepoint/v3"/>
+    <ds:schemaRef ds:uri="71af3243-3dd4-4a8d-8c0d-dd76da1f02a5"/>
+    <ds:schemaRef ds:uri="230e9df3-be65-4c73-a93b-d1236ebd677e"/>
   </ds:schemaRefs>
 </ds:datastoreItem>
 </file>
@@ -7137,13 +7498,9 @@
 </file>
 
 <file path=customXml/itemProps3.xml><?xml version="1.0" encoding="utf-8"?>
-<ds:datastoreItem xmlns:ds="http://schemas.openxmlformats.org/officeDocument/2006/customXml" ds:itemID="{2045902D-8BCA-4596-9829-0D7D1289C020}">
+<ds:datastoreItem xmlns:ds="http://schemas.openxmlformats.org/officeDocument/2006/customXml" ds:itemID="{AB64C1E2-42EA-4660-BCB7-94E6DA7562F1}">
   <ds:schemaRefs>
-    <ds:schemaRef ds:uri="http://schemas.microsoft.com/office/2006/metadata/properties"/>
-    <ds:schemaRef ds:uri="http://schemas.microsoft.com/office/infopath/2007/PartnerControls"/>
-    <ds:schemaRef ds:uri="http://schemas.microsoft.com/sharepoint/v3"/>
-    <ds:schemaRef ds:uri="71af3243-3dd4-4a8d-8c0d-dd76da1f02a5"/>
-    <ds:schemaRef ds:uri="230e9df3-be65-4c73-a93b-d1236ebd677e"/>
+    <ds:schemaRef ds:uri="http://schemas.microsoft.com/sharepoint/v3/contenttype/forms"/>
   </ds:schemaRefs>
 </ds:datastoreItem>
 </file>
</xml_diff>